<commit_message>
Bild-Unterschrift in Midterm-Präsentation hinzugefügt
</commit_message>
<xml_diff>
--- a/Presentation Slides/Midterm 23-11-2021.pptx
+++ b/Presentation Slides/Midterm 23-11-2021.pptx
@@ -117,6 +117,11 @@
       </a:defRPr>
     </a:lvl9pPr>
   </p:defaultTextStyle>
+  <p:extLst>
+    <p:ext uri="{EFAFB233-063F-42B5-8137-9DF3F51BA10A}">
+      <p15:sldGuideLst xmlns:p15="http://schemas.microsoft.com/office/powerpoint/2012/main"/>
+    </p:ext>
+  </p:extLst>
 </p:presentation>
 </file>
 
@@ -7685,7 +7690,7 @@
         </p:style>
         <p:txBody>
           <a:bodyPr lIns="90000" tIns="45000" rIns="90000" bIns="45000">
-            <a:normAutofit fontScale="83000" lnSpcReduction="10000"/>
+            <a:normAutofit fontScale="90500" lnSpcReduction="20000"/>
           </a:bodyPr>
           <a:lstStyle/>
           <a:p>
@@ -8741,7 +8746,7 @@
         </p:blipFill>
         <p:spPr>
           <a:xfrm>
-            <a:off x="1206318" y="1272896"/>
+            <a:off x="1206318" y="1219109"/>
             <a:ext cx="5600243" cy="2437084"/>
           </a:xfrm>
           <a:prstGeom prst="rect">
@@ -8770,7 +8775,7 @@
         </p:blipFill>
         <p:spPr>
           <a:xfrm>
-            <a:off x="1206318" y="3846420"/>
+            <a:off x="1206318" y="3936065"/>
             <a:ext cx="5600243" cy="1972069"/>
           </a:xfrm>
           <a:prstGeom prst="rect">
@@ -8781,6 +8786,82 @@
           </a:ln>
         </p:spPr>
       </p:pic>
+      <p:sp>
+        <p:nvSpPr>
+          <p:cNvPr id="2" name="Textfeld 1">
+            <a:extLst>
+              <a:ext uri="{FF2B5EF4-FFF2-40B4-BE49-F238E27FC236}">
+                <a16:creationId xmlns:a16="http://schemas.microsoft.com/office/drawing/2014/main" id="{2FA2BDE9-2353-4408-A345-BC551E3C281C}"/>
+              </a:ext>
+            </a:extLst>
+          </p:cNvPr>
+          <p:cNvSpPr txBox="1"/>
+          <p:nvPr/>
+        </p:nvSpPr>
+        <p:spPr>
+          <a:xfrm>
+            <a:off x="1972235" y="3514836"/>
+            <a:ext cx="3773405" cy="369332"/>
+          </a:xfrm>
+          <a:prstGeom prst="rect">
+            <a:avLst/>
+          </a:prstGeom>
+          <a:noFill/>
+        </p:spPr>
+        <p:txBody>
+          <a:bodyPr wrap="none" rtlCol="0">
+            <a:spAutoFit/>
+          </a:bodyPr>
+          <a:lstStyle/>
+          <a:p>
+            <a:r>
+              <a:rPr lang="en-GB" dirty="0">
+                <a:latin typeface="Calibri" panose="020F0502020204030204" pitchFamily="34" charset="0"/>
+                <a:cs typeface="Calibri" panose="020F0502020204030204" pitchFamily="34" charset="0"/>
+              </a:rPr>
+              <a:t>Conventional Full Adder Circuit Design</a:t>
+            </a:r>
+          </a:p>
+        </p:txBody>
+      </p:sp>
+      <p:sp>
+        <p:nvSpPr>
+          <p:cNvPr id="8" name="Textfeld 7">
+            <a:extLst>
+              <a:ext uri="{FF2B5EF4-FFF2-40B4-BE49-F238E27FC236}">
+                <a16:creationId xmlns:a16="http://schemas.microsoft.com/office/drawing/2014/main" id="{F363A1DB-F9E7-403A-AB45-CAF985EF22F9}"/>
+              </a:ext>
+            </a:extLst>
+          </p:cNvPr>
+          <p:cNvSpPr txBox="1"/>
+          <p:nvPr/>
+        </p:nvSpPr>
+        <p:spPr>
+          <a:xfrm>
+            <a:off x="1014722" y="5723468"/>
+            <a:ext cx="5983433" cy="369332"/>
+          </a:xfrm>
+          <a:prstGeom prst="rect">
+            <a:avLst/>
+          </a:prstGeom>
+          <a:noFill/>
+        </p:spPr>
+        <p:txBody>
+          <a:bodyPr wrap="none" rtlCol="0">
+            <a:spAutoFit/>
+          </a:bodyPr>
+          <a:lstStyle/>
+          <a:p>
+            <a:r>
+              <a:rPr lang="en-GB" dirty="0">
+                <a:latin typeface="Calibri" panose="020F0502020204030204" pitchFamily="34" charset="0"/>
+                <a:cs typeface="Calibri" panose="020F0502020204030204" pitchFamily="34" charset="0"/>
+              </a:rPr>
+              <a:t>Approximate Full Adder Circuit Design as proposed in [source]</a:t>
+            </a:r>
+          </a:p>
+        </p:txBody>
+      </p:sp>
     </p:spTree>
     <p:extLst>
       <p:ext uri="{BB962C8B-B14F-4D97-AF65-F5344CB8AC3E}">

</xml_diff>